<commit_message>
Adding Guru HarKrishan Sahib Gurupurab slides
</commit_message>
<xml_diff>
--- a/presentations/Today in Sikh History.pptx
+++ b/presentations/Today in Sikh History.pptx
@@ -7,6 +7,8 @@
   <p:sldIdLst>
     <p:sldId id="258" r:id="rId2"/>
     <p:sldId id="259" r:id="rId3"/>
+    <p:sldId id="260" r:id="rId4"/>
+    <p:sldId id="261" r:id="rId5"/>
   </p:sldIdLst>
   <p:sldSz cx="9144000" cy="6858000" type="screen4x3"/>
   <p:notesSz cx="6858000" cy="9144000"/>
@@ -290,7 +292,7 @@
             <a:fld id="{6A545063-6261-4625-8E4B-FC71E87DFC30}" type="datetimeFigureOut">
               <a:rPr lang="en-US" smtClean="0"/>
               <a:pPr/>
-              <a:t>7/21/2014</a:t>
+              <a:t>7/23/2014</a:t>
             </a:fld>
             <a:endParaRPr lang="en-US"/>
           </a:p>
@@ -457,7 +459,7 @@
             <a:fld id="{6A545063-6261-4625-8E4B-FC71E87DFC30}" type="datetimeFigureOut">
               <a:rPr lang="en-US" smtClean="0"/>
               <a:pPr/>
-              <a:t>7/21/2014</a:t>
+              <a:t>7/23/2014</a:t>
             </a:fld>
             <a:endParaRPr lang="en-US"/>
           </a:p>
@@ -634,7 +636,7 @@
             <a:fld id="{6A545063-6261-4625-8E4B-FC71E87DFC30}" type="datetimeFigureOut">
               <a:rPr lang="en-US" smtClean="0"/>
               <a:pPr/>
-              <a:t>7/21/2014</a:t>
+              <a:t>7/23/2014</a:t>
             </a:fld>
             <a:endParaRPr lang="en-US"/>
           </a:p>
@@ -801,7 +803,7 @@
             <a:fld id="{6A545063-6261-4625-8E4B-FC71E87DFC30}" type="datetimeFigureOut">
               <a:rPr lang="en-US" smtClean="0"/>
               <a:pPr/>
-              <a:t>7/21/2014</a:t>
+              <a:t>7/23/2014</a:t>
             </a:fld>
             <a:endParaRPr lang="en-US"/>
           </a:p>
@@ -1044,7 +1046,7 @@
             <a:fld id="{6A545063-6261-4625-8E4B-FC71E87DFC30}" type="datetimeFigureOut">
               <a:rPr lang="en-US" smtClean="0"/>
               <a:pPr/>
-              <a:t>7/21/2014</a:t>
+              <a:t>7/23/2014</a:t>
             </a:fld>
             <a:endParaRPr lang="en-US"/>
           </a:p>
@@ -1329,7 +1331,7 @@
             <a:fld id="{6A545063-6261-4625-8E4B-FC71E87DFC30}" type="datetimeFigureOut">
               <a:rPr lang="en-US" smtClean="0"/>
               <a:pPr/>
-              <a:t>7/21/2014</a:t>
+              <a:t>7/23/2014</a:t>
             </a:fld>
             <a:endParaRPr lang="en-US"/>
           </a:p>
@@ -1748,7 +1750,7 @@
             <a:fld id="{6A545063-6261-4625-8E4B-FC71E87DFC30}" type="datetimeFigureOut">
               <a:rPr lang="en-US" smtClean="0"/>
               <a:pPr/>
-              <a:t>7/21/2014</a:t>
+              <a:t>7/23/2014</a:t>
             </a:fld>
             <a:endParaRPr lang="en-US"/>
           </a:p>
@@ -1863,7 +1865,7 @@
             <a:fld id="{6A545063-6261-4625-8E4B-FC71E87DFC30}" type="datetimeFigureOut">
               <a:rPr lang="en-US" smtClean="0"/>
               <a:pPr/>
-              <a:t>7/21/2014</a:t>
+              <a:t>7/23/2014</a:t>
             </a:fld>
             <a:endParaRPr lang="en-US"/>
           </a:p>
@@ -1955,7 +1957,7 @@
             <a:fld id="{6A545063-6261-4625-8E4B-FC71E87DFC30}" type="datetimeFigureOut">
               <a:rPr lang="en-US" smtClean="0"/>
               <a:pPr/>
-              <a:t>7/21/2014</a:t>
+              <a:t>7/23/2014</a:t>
             </a:fld>
             <a:endParaRPr lang="en-US"/>
           </a:p>
@@ -2229,7 +2231,7 @@
             <a:fld id="{6A545063-6261-4625-8E4B-FC71E87DFC30}" type="datetimeFigureOut">
               <a:rPr lang="en-US" smtClean="0"/>
               <a:pPr/>
-              <a:t>7/21/2014</a:t>
+              <a:t>7/23/2014</a:t>
             </a:fld>
             <a:endParaRPr lang="en-US"/>
           </a:p>
@@ -2479,7 +2481,7 @@
             <a:fld id="{6A545063-6261-4625-8E4B-FC71E87DFC30}" type="datetimeFigureOut">
               <a:rPr lang="en-US" smtClean="0"/>
               <a:pPr/>
-              <a:t>7/21/2014</a:t>
+              <a:t>7/23/2014</a:t>
             </a:fld>
             <a:endParaRPr lang="en-US"/>
           </a:p>
@@ -2699,7 +2701,7 @@
             <a:fld id="{6A545063-6261-4625-8E4B-FC71E87DFC30}" type="datetimeFigureOut">
               <a:rPr lang="en-US" smtClean="0"/>
               <a:pPr/>
-              <a:t>7/21/2014</a:t>
+              <a:t>7/23/2014</a:t>
             </a:fld>
             <a:endParaRPr lang="en-US"/>
           </a:p>
@@ -3446,31 +3448,7 @@
                   <a:schemeClr val="bg1"/>
                 </a:solidFill>
               </a:rPr>
-              <a:t>Today in Sikh History – </a:t>
-            </a:r>
-            <a:r>
-              <a:rPr lang="en-US" b="1" dirty="0" smtClean="0">
-                <a:solidFill>
-                  <a:schemeClr val="bg1"/>
-                </a:solidFill>
-              </a:rPr>
-              <a:t>21</a:t>
-            </a:r>
-            <a:r>
-              <a:rPr lang="en-US" b="1" dirty="0" smtClean="0">
-                <a:solidFill>
-                  <a:schemeClr val="bg1"/>
-                </a:solidFill>
-              </a:rPr>
-              <a:t> </a:t>
-            </a:r>
-            <a:r>
-              <a:rPr lang="en-US" b="1" dirty="0" smtClean="0">
-                <a:solidFill>
-                  <a:schemeClr val="bg1"/>
-                </a:solidFill>
-              </a:rPr>
-              <a:t>July </a:t>
+              <a:t>Today in Sikh History – 21 July </a:t>
             </a:r>
             <a:endParaRPr lang="en-US" b="1" dirty="0">
               <a:solidFill>
@@ -3519,7 +3497,15 @@
                   <a:schemeClr val="bg1"/>
                 </a:solidFill>
               </a:rPr>
-              <a:t> : 6th Guru- </a:t>
+              <a:t> : 6th Guru- Sahib Guru </a:t>
+            </a:r>
+            <a:r>
+              <a:rPr lang="en-US" dirty="0" err="1" smtClean="0">
+                <a:solidFill>
+                  <a:schemeClr val="bg1"/>
+                </a:solidFill>
+              </a:rPr>
+              <a:t>Hargobind</a:t>
             </a:r>
             <a:r>
               <a:rPr lang="en-US" dirty="0" smtClean="0">
@@ -3527,7 +3513,7 @@
                   <a:schemeClr val="bg1"/>
                 </a:solidFill>
               </a:rPr>
-              <a:t>Sahib Guru </a:t>
+              <a:t> Sahib </a:t>
             </a:r>
             <a:r>
               <a:rPr lang="en-US" dirty="0" err="1" smtClean="0">
@@ -3535,7 +3521,7 @@
                   <a:schemeClr val="bg1"/>
                 </a:solidFill>
               </a:rPr>
-              <a:t>Hargobind</a:t>
+              <a:t>Ji</a:t>
             </a:r>
             <a:r>
               <a:rPr lang="en-US" dirty="0" smtClean="0">
@@ -3543,7 +3529,7 @@
                   <a:schemeClr val="bg1"/>
                 </a:solidFill>
               </a:rPr>
-              <a:t> Sahib </a:t>
+              <a:t> wore     	two </a:t>
             </a:r>
             <a:r>
               <a:rPr lang="en-US" dirty="0" err="1" smtClean="0">
@@ -3551,7 +3537,7 @@
                   <a:schemeClr val="bg1"/>
                 </a:solidFill>
               </a:rPr>
-              <a:t>Ji</a:t>
+              <a:t>Kirpans</a:t>
             </a:r>
             <a:r>
               <a:rPr lang="en-US" dirty="0" smtClean="0">
@@ -3559,7 +3545,15 @@
                   <a:schemeClr val="bg1"/>
                 </a:solidFill>
               </a:rPr>
-              <a:t> wore </a:t>
+              <a:t> representing </a:t>
+            </a:r>
+            <a:r>
+              <a:rPr lang="en-US" dirty="0" err="1" smtClean="0">
+                <a:solidFill>
+                  <a:schemeClr val="bg1"/>
+                </a:solidFill>
+              </a:rPr>
+              <a:t>Miri</a:t>
             </a:r>
             <a:r>
               <a:rPr lang="en-US" dirty="0" smtClean="0">
@@ -3567,7 +3561,7 @@
                   <a:schemeClr val="bg1"/>
                 </a:solidFill>
               </a:rPr>
-              <a:t>    	two </a:t>
+              <a:t> and </a:t>
             </a:r>
             <a:r>
               <a:rPr lang="en-US" dirty="0" err="1" smtClean="0">
@@ -3575,7 +3569,7 @@
                   <a:schemeClr val="bg1"/>
                 </a:solidFill>
               </a:rPr>
-              <a:t>Kirpans</a:t>
+              <a:t>Piri</a:t>
             </a:r>
             <a:r>
               <a:rPr lang="en-US" dirty="0" smtClean="0">
@@ -3583,7 +3577,7 @@
                   <a:schemeClr val="bg1"/>
                 </a:solidFill>
               </a:rPr>
-              <a:t> representing </a:t>
+              <a:t> at </a:t>
             </a:r>
             <a:r>
               <a:rPr lang="en-US" dirty="0" err="1" smtClean="0">
@@ -3591,7 +3585,7 @@
                   <a:schemeClr val="bg1"/>
                 </a:solidFill>
               </a:rPr>
-              <a:t>Miri</a:t>
+              <a:t>Shri</a:t>
             </a:r>
             <a:r>
               <a:rPr lang="en-US" dirty="0" smtClean="0">
@@ -3599,7 +3593,7 @@
                   <a:schemeClr val="bg1"/>
                 </a:solidFill>
               </a:rPr>
-              <a:t> and </a:t>
+              <a:t> 	Akal </a:t>
             </a:r>
             <a:r>
               <a:rPr lang="en-US" dirty="0" err="1" smtClean="0">
@@ -3607,7 +3601,7 @@
                   <a:schemeClr val="bg1"/>
                 </a:solidFill>
               </a:rPr>
-              <a:t>Piri</a:t>
+              <a:t>Thakht</a:t>
             </a:r>
             <a:r>
               <a:rPr lang="en-US" dirty="0" smtClean="0">
@@ -3615,55 +3609,7 @@
                   <a:schemeClr val="bg1"/>
                 </a:solidFill>
               </a:rPr>
-              <a:t> at </a:t>
-            </a:r>
-            <a:r>
-              <a:rPr lang="en-US" dirty="0" err="1" smtClean="0">
-                <a:solidFill>
-                  <a:schemeClr val="bg1"/>
-                </a:solidFill>
-              </a:rPr>
-              <a:t>Shri</a:t>
-            </a:r>
-            <a:r>
-              <a:rPr lang="en-US" dirty="0" smtClean="0">
-                <a:solidFill>
-                  <a:schemeClr val="bg1"/>
-                </a:solidFill>
-              </a:rPr>
-              <a:t> 	Akal </a:t>
-            </a:r>
-            <a:r>
-              <a:rPr lang="en-US" dirty="0" err="1" smtClean="0">
-                <a:solidFill>
-                  <a:schemeClr val="bg1"/>
-                </a:solidFill>
-              </a:rPr>
-              <a:t>Thakht</a:t>
-            </a:r>
-            <a:r>
-              <a:rPr lang="en-US" dirty="0" smtClean="0">
-                <a:solidFill>
-                  <a:schemeClr val="bg1"/>
-                </a:solidFill>
-              </a:rPr>
-              <a:t> </a:t>
-            </a:r>
-            <a:r>
-              <a:rPr lang="en-US" dirty="0" smtClean="0">
-                <a:solidFill>
-                  <a:schemeClr val="bg1"/>
-                </a:solidFill>
-              </a:rPr>
-              <a:t>Sahib</a:t>
-            </a:r>
-            <a:r>
-              <a:rPr lang="en-US" dirty="0" smtClean="0">
-                <a:solidFill>
-                  <a:schemeClr val="bg1"/>
-                </a:solidFill>
-              </a:rPr>
-              <a:t>.</a:t>
+              <a:t> Sahib.</a:t>
             </a:r>
           </a:p>
           <a:p>
@@ -3793,7 +3739,20 @@
                   <a:schemeClr val="bg1"/>
                 </a:solidFill>
               </a:rPr>
-              <a:t> Sikhs were </a:t>
+              <a:t> Sikhs were 	 hanged to death in Lahore</a:t>
+            </a:r>
+          </a:p>
+          <a:p>
+            <a:pPr>
+              <a:buNone/>
+            </a:pPr>
+            <a:r>
+              <a:rPr lang="en-US" b="1" dirty="0" smtClean="0">
+                <a:solidFill>
+                  <a:schemeClr val="bg1"/>
+                </a:solidFill>
+              </a:rPr>
+              <a:t>1925 :</a:t>
             </a:r>
             <a:r>
               <a:rPr lang="en-US" dirty="0" smtClean="0">
@@ -3801,7 +3760,15 @@
                   <a:schemeClr val="bg1"/>
                 </a:solidFill>
               </a:rPr>
-              <a:t>	 hanged </a:t>
+              <a:t> Police and Army of </a:t>
+            </a:r>
+            <a:r>
+              <a:rPr lang="en-US" dirty="0" err="1" smtClean="0">
+                <a:solidFill>
+                  <a:schemeClr val="bg1"/>
+                </a:solidFill>
+              </a:rPr>
+              <a:t>Nabha</a:t>
             </a:r>
             <a:r>
               <a:rPr lang="en-US" dirty="0" smtClean="0">
@@ -3809,7 +3776,15 @@
                   <a:schemeClr val="bg1"/>
                 </a:solidFill>
               </a:rPr>
-              <a:t>to death in </a:t>
+              <a:t> lifted the </a:t>
+            </a:r>
+            <a:r>
+              <a:rPr lang="en-US" dirty="0" err="1" smtClean="0">
+                <a:solidFill>
+                  <a:schemeClr val="bg1"/>
+                </a:solidFill>
+              </a:rPr>
+              <a:t>seige</a:t>
             </a:r>
             <a:r>
               <a:rPr lang="en-US" dirty="0" smtClean="0">
@@ -3817,76 +3792,7 @@
                   <a:schemeClr val="bg1"/>
                 </a:solidFill>
               </a:rPr>
-              <a:t>Lahore</a:t>
-            </a:r>
-          </a:p>
-          <a:p>
-            <a:pPr>
-              <a:buNone/>
-            </a:pPr>
-            <a:r>
-              <a:rPr lang="en-US" b="1" dirty="0" smtClean="0">
-                <a:solidFill>
-                  <a:schemeClr val="bg1"/>
-                </a:solidFill>
-              </a:rPr>
-              <a:t>1925 :</a:t>
-            </a:r>
-            <a:r>
-              <a:rPr lang="en-US" dirty="0" smtClean="0">
-                <a:solidFill>
-                  <a:schemeClr val="bg1"/>
-                </a:solidFill>
-              </a:rPr>
-              <a:t> Police and Army of </a:t>
-            </a:r>
-            <a:r>
-              <a:rPr lang="en-US" dirty="0" err="1" smtClean="0">
-                <a:solidFill>
-                  <a:schemeClr val="bg1"/>
-                </a:solidFill>
-              </a:rPr>
-              <a:t>Nabha</a:t>
-            </a:r>
-            <a:r>
-              <a:rPr lang="en-US" dirty="0" smtClean="0">
-                <a:solidFill>
-                  <a:schemeClr val="bg1"/>
-                </a:solidFill>
-              </a:rPr>
-              <a:t> lifted the </a:t>
-            </a:r>
-            <a:r>
-              <a:rPr lang="en-US" dirty="0" err="1" smtClean="0">
-                <a:solidFill>
-                  <a:schemeClr val="bg1"/>
-                </a:solidFill>
-              </a:rPr>
-              <a:t>seige</a:t>
-            </a:r>
-            <a:r>
-              <a:rPr lang="en-US" dirty="0" smtClean="0">
-                <a:solidFill>
-                  <a:schemeClr val="bg1"/>
-                </a:solidFill>
-              </a:rPr>
-              <a:t> </a:t>
-            </a:r>
-            <a:r>
-              <a:rPr lang="en-US" dirty="0" smtClean="0">
-                <a:solidFill>
-                  <a:schemeClr val="bg1"/>
-                </a:solidFill>
-              </a:rPr>
-              <a:t>of </a:t>
-            </a:r>
-            <a:r>
-              <a:rPr lang="en-US" dirty="0" smtClean="0">
-                <a:solidFill>
-                  <a:schemeClr val="bg1"/>
-                </a:solidFill>
-              </a:rPr>
-              <a:t>	 </a:t>
+              <a:t> of 	 </a:t>
             </a:r>
             <a:r>
               <a:rPr lang="en-US" dirty="0" err="1" smtClean="0">
@@ -3962,6 +3868,360 @@
           <a:xfrm>
             <a:off x="5317236" y="2234668"/>
             <a:ext cx="3064764" cy="2108732"/>
+          </a:xfrm>
+          <a:prstGeom prst="rect">
+            <a:avLst/>
+          </a:prstGeom>
+        </p:spPr>
+      </p:pic>
+    </p:spTree>
+  </p:cSld>
+  <p:clrMapOvr>
+    <a:masterClrMapping/>
+  </p:clrMapOvr>
+  <p:timing>
+    <p:tnLst>
+      <p:par>
+        <p:cTn id="1" dur="indefinite" restart="never" nodeType="tmRoot"/>
+      </p:par>
+    </p:tnLst>
+  </p:timing>
+</p:sld>
+</file>
+
+<file path=ppt/slides/slide3.xml><?xml version="1.0" encoding="utf-8"?>
+<p:sld xmlns:a="http://schemas.openxmlformats.org/drawingml/2006/main" xmlns:r="http://schemas.openxmlformats.org/officeDocument/2006/relationships" xmlns:p="http://schemas.openxmlformats.org/presentationml/2006/main">
+  <p:cSld>
+    <p:bg>
+      <p:bgPr>
+        <a:solidFill>
+          <a:srgbClr val="002060">
+            <a:alpha val="84000"/>
+          </a:srgbClr>
+        </a:solidFill>
+        <a:effectLst/>
+      </p:bgPr>
+    </p:bg>
+    <p:spTree>
+      <p:nvGrpSpPr>
+        <p:cNvPr id="1" name=""/>
+        <p:cNvGrpSpPr/>
+        <p:nvPr/>
+      </p:nvGrpSpPr>
+      <p:grpSpPr>
+        <a:xfrm>
+          <a:off x="0" y="0"/>
+          <a:ext cx="0" cy="0"/>
+          <a:chOff x="0" y="0"/>
+          <a:chExt cx="0" cy="0"/>
+        </a:xfrm>
+      </p:grpSpPr>
+      <p:sp>
+        <p:nvSpPr>
+          <p:cNvPr id="2" name="Title 1"/>
+          <p:cNvSpPr>
+            <a:spLocks noGrp="1"/>
+          </p:cNvSpPr>
+          <p:nvPr>
+            <p:ph type="title"/>
+          </p:nvPr>
+        </p:nvSpPr>
+        <p:spPr/>
+        <p:txBody>
+          <a:bodyPr/>
+          <a:lstStyle/>
+          <a:p>
+            <a:r>
+              <a:rPr lang="en-US" b="1" dirty="0" smtClean="0">
+                <a:solidFill>
+                  <a:schemeClr val="bg1"/>
+                </a:solidFill>
+              </a:rPr>
+              <a:t>Today in Sikh History – </a:t>
+            </a:r>
+            <a:r>
+              <a:rPr lang="en-US" b="1" dirty="0" smtClean="0">
+                <a:solidFill>
+                  <a:schemeClr val="bg1"/>
+                </a:solidFill>
+              </a:rPr>
+              <a:t>23</a:t>
+            </a:r>
+            <a:r>
+              <a:rPr lang="en-US" b="1" baseline="30000" dirty="0" smtClean="0">
+                <a:solidFill>
+                  <a:schemeClr val="bg1"/>
+                </a:solidFill>
+              </a:rPr>
+              <a:t>rd</a:t>
+            </a:r>
+            <a:r>
+              <a:rPr lang="en-US" b="1" dirty="0" smtClean="0">
+                <a:solidFill>
+                  <a:schemeClr val="bg1"/>
+                </a:solidFill>
+              </a:rPr>
+              <a:t>  </a:t>
+            </a:r>
+            <a:r>
+              <a:rPr lang="en-US" b="1" dirty="0" smtClean="0">
+                <a:solidFill>
+                  <a:schemeClr val="bg1"/>
+                </a:solidFill>
+              </a:rPr>
+              <a:t>July </a:t>
+            </a:r>
+            <a:endParaRPr lang="en-US" b="1" dirty="0">
+              <a:solidFill>
+                <a:schemeClr val="bg1"/>
+              </a:solidFill>
+            </a:endParaRPr>
+          </a:p>
+        </p:txBody>
+      </p:sp>
+      <p:sp>
+        <p:nvSpPr>
+          <p:cNvPr id="3" name="Content Placeholder 2"/>
+          <p:cNvSpPr>
+            <a:spLocks noGrp="1"/>
+          </p:cNvSpPr>
+          <p:nvPr>
+            <p:ph idx="1"/>
+          </p:nvPr>
+        </p:nvSpPr>
+        <p:spPr>
+          <a:xfrm>
+            <a:off x="381000" y="1219200"/>
+            <a:ext cx="8382000" cy="5334000"/>
+          </a:xfrm>
+        </p:spPr>
+        <p:txBody>
+          <a:bodyPr>
+            <a:normAutofit/>
+          </a:bodyPr>
+          <a:lstStyle/>
+          <a:p>
+            <a:pPr>
+              <a:buNone/>
+            </a:pPr>
+            <a:r>
+              <a:rPr lang="en-US" dirty="0" smtClean="0">
+                <a:solidFill>
+                  <a:schemeClr val="bg1"/>
+                </a:solidFill>
+              </a:rPr>
+              <a:t/>
+            </a:r>
+            <a:br>
+              <a:rPr lang="en-US" dirty="0" smtClean="0">
+                <a:solidFill>
+                  <a:schemeClr val="bg1"/>
+                </a:solidFill>
+              </a:rPr>
+            </a:br>
+            <a:endParaRPr lang="en-US" dirty="0">
+              <a:solidFill>
+                <a:schemeClr val="bg1"/>
+              </a:solidFill>
+            </a:endParaRPr>
+          </a:p>
+        </p:txBody>
+      </p:sp>
+      <p:pic>
+        <p:nvPicPr>
+          <p:cNvPr id="6" name="Picture 5" descr="Guru-Harkishan-Sahib-Ji-B.jpg"/>
+          <p:cNvPicPr>
+            <a:picLocks noChangeAspect="1"/>
+          </p:cNvPicPr>
+          <p:nvPr/>
+        </p:nvPicPr>
+        <p:blipFill>
+          <a:blip r:embed="rId2"/>
+          <a:stretch>
+            <a:fillRect/>
+          </a:stretch>
+        </p:blipFill>
+        <p:spPr>
+          <a:xfrm>
+            <a:off x="215255" y="1595628"/>
+            <a:ext cx="8776345" cy="4195572"/>
+          </a:xfrm>
+          <a:prstGeom prst="rect">
+            <a:avLst/>
+          </a:prstGeom>
+        </p:spPr>
+      </p:pic>
+    </p:spTree>
+  </p:cSld>
+  <p:clrMapOvr>
+    <a:masterClrMapping/>
+  </p:clrMapOvr>
+  <p:timing>
+    <p:tnLst>
+      <p:par>
+        <p:cTn id="1" dur="indefinite" restart="never" nodeType="tmRoot"/>
+      </p:par>
+    </p:tnLst>
+  </p:timing>
+</p:sld>
+</file>
+
+<file path=ppt/slides/slide4.xml><?xml version="1.0" encoding="utf-8"?>
+<p:sld xmlns:a="http://schemas.openxmlformats.org/drawingml/2006/main" xmlns:r="http://schemas.openxmlformats.org/officeDocument/2006/relationships" xmlns:p="http://schemas.openxmlformats.org/presentationml/2006/main">
+  <p:cSld>
+    <p:bg>
+      <p:bgPr>
+        <a:solidFill>
+          <a:srgbClr val="002060">
+            <a:alpha val="84000"/>
+          </a:srgbClr>
+        </a:solidFill>
+        <a:effectLst/>
+      </p:bgPr>
+    </p:bg>
+    <p:spTree>
+      <p:nvGrpSpPr>
+        <p:cNvPr id="1" name=""/>
+        <p:cNvGrpSpPr/>
+        <p:nvPr/>
+      </p:nvGrpSpPr>
+      <p:grpSpPr>
+        <a:xfrm>
+          <a:off x="0" y="0"/>
+          <a:ext cx="0" cy="0"/>
+          <a:chOff x="0" y="0"/>
+          <a:chExt cx="0" cy="0"/>
+        </a:xfrm>
+      </p:grpSpPr>
+      <p:sp>
+        <p:nvSpPr>
+          <p:cNvPr id="2" name="Title 1"/>
+          <p:cNvSpPr>
+            <a:spLocks noGrp="1"/>
+          </p:cNvSpPr>
+          <p:nvPr>
+            <p:ph type="title"/>
+          </p:nvPr>
+        </p:nvSpPr>
+        <p:spPr/>
+        <p:txBody>
+          <a:bodyPr/>
+          <a:lstStyle/>
+          <a:p>
+            <a:r>
+              <a:rPr lang="en-US" b="1" dirty="0" smtClean="0">
+                <a:solidFill>
+                  <a:schemeClr val="bg1"/>
+                </a:solidFill>
+              </a:rPr>
+              <a:t>Today in Sikh History – </a:t>
+            </a:r>
+            <a:r>
+              <a:rPr lang="en-US" b="1" dirty="0" smtClean="0">
+                <a:solidFill>
+                  <a:schemeClr val="bg1"/>
+                </a:solidFill>
+              </a:rPr>
+              <a:t>23</a:t>
+            </a:r>
+            <a:r>
+              <a:rPr lang="en-US" b="1" baseline="30000" dirty="0" smtClean="0">
+                <a:solidFill>
+                  <a:schemeClr val="bg1"/>
+                </a:solidFill>
+              </a:rPr>
+              <a:t>rd</a:t>
+            </a:r>
+            <a:r>
+              <a:rPr lang="en-US" b="1" dirty="0" smtClean="0">
+                <a:solidFill>
+                  <a:schemeClr val="bg1"/>
+                </a:solidFill>
+              </a:rPr>
+              <a:t>  </a:t>
+            </a:r>
+            <a:r>
+              <a:rPr lang="en-US" b="1" dirty="0" smtClean="0">
+                <a:solidFill>
+                  <a:schemeClr val="bg1"/>
+                </a:solidFill>
+              </a:rPr>
+              <a:t>July </a:t>
+            </a:r>
+            <a:endParaRPr lang="en-US" b="1" dirty="0">
+              <a:solidFill>
+                <a:schemeClr val="bg1"/>
+              </a:solidFill>
+            </a:endParaRPr>
+          </a:p>
+        </p:txBody>
+      </p:sp>
+      <p:sp>
+        <p:nvSpPr>
+          <p:cNvPr id="3" name="Content Placeholder 2"/>
+          <p:cNvSpPr>
+            <a:spLocks noGrp="1"/>
+          </p:cNvSpPr>
+          <p:nvPr>
+            <p:ph idx="1"/>
+          </p:nvPr>
+        </p:nvSpPr>
+        <p:spPr>
+          <a:xfrm>
+            <a:off x="381000" y="1219200"/>
+            <a:ext cx="8382000" cy="5334000"/>
+          </a:xfrm>
+        </p:spPr>
+        <p:txBody>
+          <a:bodyPr>
+            <a:normAutofit/>
+          </a:bodyPr>
+          <a:lstStyle/>
+          <a:p>
+            <a:pPr>
+              <a:buNone/>
+            </a:pPr>
+            <a:r>
+              <a:rPr lang="en-US" dirty="0" smtClean="0">
+                <a:solidFill>
+                  <a:schemeClr val="bg1"/>
+                </a:solidFill>
+              </a:rPr>
+              <a:t/>
+            </a:r>
+            <a:br>
+              <a:rPr lang="en-US" dirty="0" smtClean="0">
+                <a:solidFill>
+                  <a:schemeClr val="bg1"/>
+                </a:solidFill>
+              </a:rPr>
+            </a:br>
+            <a:endParaRPr lang="en-US" dirty="0">
+              <a:solidFill>
+                <a:schemeClr val="bg1"/>
+              </a:solidFill>
+            </a:endParaRPr>
+          </a:p>
+        </p:txBody>
+      </p:sp>
+      <p:pic>
+        <p:nvPicPr>
+          <p:cNvPr id="5" name="Picture 4" descr="gita.jpg"/>
+          <p:cNvPicPr>
+            <a:picLocks noChangeAspect="1"/>
+          </p:cNvPicPr>
+          <p:nvPr/>
+        </p:nvPicPr>
+        <p:blipFill>
+          <a:blip r:embed="rId2"/>
+          <a:stretch>
+            <a:fillRect/>
+          </a:stretch>
+        </p:blipFill>
+        <p:spPr>
+          <a:xfrm>
+            <a:off x="990600" y="1619250"/>
+            <a:ext cx="7217265" cy="4629150"/>
           </a:xfrm>
           <a:prstGeom prst="rect">
             <a:avLst/>

</xml_diff>

<commit_message>
Adding Bhagat Puran Singh , Today in Sikh History 5 Aug
</commit_message>
<xml_diff>
--- a/presentations/Today in Sikh History.pptx
+++ b/presentations/Today in Sikh History.pptx
@@ -9,6 +9,7 @@
     <p:sldId id="259" r:id="rId3"/>
     <p:sldId id="260" r:id="rId4"/>
     <p:sldId id="261" r:id="rId5"/>
+    <p:sldId id="262" r:id="rId6"/>
   </p:sldIdLst>
   <p:sldSz cx="9144000" cy="6858000" type="screen4x3"/>
   <p:notesSz cx="6858000" cy="9144000"/>
@@ -292,7 +293,7 @@
             <a:fld id="{6A545063-6261-4625-8E4B-FC71E87DFC30}" type="datetimeFigureOut">
               <a:rPr lang="en-US" smtClean="0"/>
               <a:pPr/>
-              <a:t>7/23/2014</a:t>
+              <a:t>8/5/2014</a:t>
             </a:fld>
             <a:endParaRPr lang="en-US"/>
           </a:p>
@@ -459,7 +460,7 @@
             <a:fld id="{6A545063-6261-4625-8E4B-FC71E87DFC30}" type="datetimeFigureOut">
               <a:rPr lang="en-US" smtClean="0"/>
               <a:pPr/>
-              <a:t>7/23/2014</a:t>
+              <a:t>8/5/2014</a:t>
             </a:fld>
             <a:endParaRPr lang="en-US"/>
           </a:p>
@@ -636,7 +637,7 @@
             <a:fld id="{6A545063-6261-4625-8E4B-FC71E87DFC30}" type="datetimeFigureOut">
               <a:rPr lang="en-US" smtClean="0"/>
               <a:pPr/>
-              <a:t>7/23/2014</a:t>
+              <a:t>8/5/2014</a:t>
             </a:fld>
             <a:endParaRPr lang="en-US"/>
           </a:p>
@@ -803,7 +804,7 @@
             <a:fld id="{6A545063-6261-4625-8E4B-FC71E87DFC30}" type="datetimeFigureOut">
               <a:rPr lang="en-US" smtClean="0"/>
               <a:pPr/>
-              <a:t>7/23/2014</a:t>
+              <a:t>8/5/2014</a:t>
             </a:fld>
             <a:endParaRPr lang="en-US"/>
           </a:p>
@@ -1046,7 +1047,7 @@
             <a:fld id="{6A545063-6261-4625-8E4B-FC71E87DFC30}" type="datetimeFigureOut">
               <a:rPr lang="en-US" smtClean="0"/>
               <a:pPr/>
-              <a:t>7/23/2014</a:t>
+              <a:t>8/5/2014</a:t>
             </a:fld>
             <a:endParaRPr lang="en-US"/>
           </a:p>
@@ -1331,7 +1332,7 @@
             <a:fld id="{6A545063-6261-4625-8E4B-FC71E87DFC30}" type="datetimeFigureOut">
               <a:rPr lang="en-US" smtClean="0"/>
               <a:pPr/>
-              <a:t>7/23/2014</a:t>
+              <a:t>8/5/2014</a:t>
             </a:fld>
             <a:endParaRPr lang="en-US"/>
           </a:p>
@@ -1750,7 +1751,7 @@
             <a:fld id="{6A545063-6261-4625-8E4B-FC71E87DFC30}" type="datetimeFigureOut">
               <a:rPr lang="en-US" smtClean="0"/>
               <a:pPr/>
-              <a:t>7/23/2014</a:t>
+              <a:t>8/5/2014</a:t>
             </a:fld>
             <a:endParaRPr lang="en-US"/>
           </a:p>
@@ -1865,7 +1866,7 @@
             <a:fld id="{6A545063-6261-4625-8E4B-FC71E87DFC30}" type="datetimeFigureOut">
               <a:rPr lang="en-US" smtClean="0"/>
               <a:pPr/>
-              <a:t>7/23/2014</a:t>
+              <a:t>8/5/2014</a:t>
             </a:fld>
             <a:endParaRPr lang="en-US"/>
           </a:p>
@@ -1957,7 +1958,7 @@
             <a:fld id="{6A545063-6261-4625-8E4B-FC71E87DFC30}" type="datetimeFigureOut">
               <a:rPr lang="en-US" smtClean="0"/>
               <a:pPr/>
-              <a:t>7/23/2014</a:t>
+              <a:t>8/5/2014</a:t>
             </a:fld>
             <a:endParaRPr lang="en-US"/>
           </a:p>
@@ -2231,7 +2232,7 @@
             <a:fld id="{6A545063-6261-4625-8E4B-FC71E87DFC30}" type="datetimeFigureOut">
               <a:rPr lang="en-US" smtClean="0"/>
               <a:pPr/>
-              <a:t>7/23/2014</a:t>
+              <a:t>8/5/2014</a:t>
             </a:fld>
             <a:endParaRPr lang="en-US"/>
           </a:p>
@@ -2481,7 +2482,7 @@
             <a:fld id="{6A545063-6261-4625-8E4B-FC71E87DFC30}" type="datetimeFigureOut">
               <a:rPr lang="en-US" smtClean="0"/>
               <a:pPr/>
-              <a:t>7/23/2014</a:t>
+              <a:t>8/5/2014</a:t>
             </a:fld>
             <a:endParaRPr lang="en-US"/>
           </a:p>
@@ -2701,7 +2702,7 @@
             <a:fld id="{6A545063-6261-4625-8E4B-FC71E87DFC30}" type="datetimeFigureOut">
               <a:rPr lang="en-US" smtClean="0"/>
               <a:pPr/>
-              <a:t>7/23/2014</a:t>
+              <a:t>8/5/2014</a:t>
             </a:fld>
             <a:endParaRPr lang="en-US"/>
           </a:p>
@@ -3937,7 +3938,15 @@
                   <a:schemeClr val="bg1"/>
                 </a:solidFill>
               </a:rPr>
-              <a:t>Today in Sikh History – </a:t>
+              <a:t>Today in Sikh History – 23</a:t>
+            </a:r>
+            <a:r>
+              <a:rPr lang="en-US" b="1" baseline="30000" dirty="0" smtClean="0">
+                <a:solidFill>
+                  <a:schemeClr val="bg1"/>
+                </a:solidFill>
+              </a:rPr>
+              <a:t>rd</a:t>
             </a:r>
             <a:r>
               <a:rPr lang="en-US" b="1" dirty="0" smtClean="0">
@@ -3945,31 +3954,7 @@
                   <a:schemeClr val="bg1"/>
                 </a:solidFill>
               </a:rPr>
-              <a:t>23</a:t>
-            </a:r>
-            <a:r>
-              <a:rPr lang="en-US" b="1" baseline="30000" dirty="0" smtClean="0">
-                <a:solidFill>
-                  <a:schemeClr val="bg1"/>
-                </a:solidFill>
-              </a:rPr>
-              <a:t>rd</a:t>
-            </a:r>
-            <a:r>
-              <a:rPr lang="en-US" b="1" dirty="0" smtClean="0">
-                <a:solidFill>
-                  <a:schemeClr val="bg1"/>
-                </a:solidFill>
-              </a:rPr>
-              <a:t>  </a:t>
-            </a:r>
-            <a:r>
-              <a:rPr lang="en-US" b="1" dirty="0" smtClean="0">
-                <a:solidFill>
-                  <a:schemeClr val="bg1"/>
-                </a:solidFill>
-              </a:rPr>
-              <a:t>July </a:t>
+              <a:t>  July </a:t>
             </a:r>
             <a:endParaRPr lang="en-US" b="1" dirty="0">
               <a:solidFill>
@@ -4114,7 +4099,15 @@
                   <a:schemeClr val="bg1"/>
                 </a:solidFill>
               </a:rPr>
-              <a:t>Today in Sikh History – </a:t>
+              <a:t>Today in Sikh History – 23</a:t>
+            </a:r>
+            <a:r>
+              <a:rPr lang="en-US" b="1" baseline="30000" dirty="0" smtClean="0">
+                <a:solidFill>
+                  <a:schemeClr val="bg1"/>
+                </a:solidFill>
+              </a:rPr>
+              <a:t>rd</a:t>
             </a:r>
             <a:r>
               <a:rPr lang="en-US" b="1" dirty="0" smtClean="0">
@@ -4122,31 +4115,7 @@
                   <a:schemeClr val="bg1"/>
                 </a:solidFill>
               </a:rPr>
-              <a:t>23</a:t>
-            </a:r>
-            <a:r>
-              <a:rPr lang="en-US" b="1" baseline="30000" dirty="0" smtClean="0">
-                <a:solidFill>
-                  <a:schemeClr val="bg1"/>
-                </a:solidFill>
-              </a:rPr>
-              <a:t>rd</a:t>
-            </a:r>
-            <a:r>
-              <a:rPr lang="en-US" b="1" dirty="0" smtClean="0">
-                <a:solidFill>
-                  <a:schemeClr val="bg1"/>
-                </a:solidFill>
-              </a:rPr>
-              <a:t>  </a:t>
-            </a:r>
-            <a:r>
-              <a:rPr lang="en-US" b="1" dirty="0" smtClean="0">
-                <a:solidFill>
-                  <a:schemeClr val="bg1"/>
-                </a:solidFill>
-              </a:rPr>
-              <a:t>July </a:t>
+              <a:t>  July </a:t>
             </a:r>
             <a:endParaRPr lang="en-US" b="1" dirty="0">
               <a:solidFill>
@@ -4226,6 +4195,331 @@
           <a:prstGeom prst="rect">
             <a:avLst/>
           </a:prstGeom>
+        </p:spPr>
+      </p:pic>
+    </p:spTree>
+  </p:cSld>
+  <p:clrMapOvr>
+    <a:masterClrMapping/>
+  </p:clrMapOvr>
+  <p:timing>
+    <p:tnLst>
+      <p:par>
+        <p:cTn id="1" dur="indefinite" restart="never" nodeType="tmRoot"/>
+      </p:par>
+    </p:tnLst>
+  </p:timing>
+</p:sld>
+</file>
+
+<file path=ppt/slides/slide5.xml><?xml version="1.0" encoding="utf-8"?>
+<p:sld xmlns:a="http://schemas.openxmlformats.org/drawingml/2006/main" xmlns:r="http://schemas.openxmlformats.org/officeDocument/2006/relationships" xmlns:p="http://schemas.openxmlformats.org/presentationml/2006/main">
+  <p:cSld>
+    <p:bg>
+      <p:bgPr>
+        <a:solidFill>
+          <a:srgbClr val="002060">
+            <a:alpha val="84000"/>
+          </a:srgbClr>
+        </a:solidFill>
+        <a:effectLst/>
+      </p:bgPr>
+    </p:bg>
+    <p:spTree>
+      <p:nvGrpSpPr>
+        <p:cNvPr id="1" name=""/>
+        <p:cNvGrpSpPr/>
+        <p:nvPr/>
+      </p:nvGrpSpPr>
+      <p:grpSpPr>
+        <a:xfrm>
+          <a:off x="0" y="0"/>
+          <a:ext cx="0" cy="0"/>
+          <a:chOff x="0" y="0"/>
+          <a:chExt cx="0" cy="0"/>
+        </a:xfrm>
+      </p:grpSpPr>
+      <p:sp>
+        <p:nvSpPr>
+          <p:cNvPr id="2" name="Title 1"/>
+          <p:cNvSpPr>
+            <a:spLocks noGrp="1"/>
+          </p:cNvSpPr>
+          <p:nvPr>
+            <p:ph type="title"/>
+          </p:nvPr>
+        </p:nvSpPr>
+        <p:spPr/>
+        <p:txBody>
+          <a:bodyPr/>
+          <a:lstStyle/>
+          <a:p>
+            <a:r>
+              <a:rPr lang="en-US" b="1" dirty="0" smtClean="0">
+                <a:solidFill>
+                  <a:schemeClr val="bg1"/>
+                </a:solidFill>
+              </a:rPr>
+              <a:t>Today in Sikh History – </a:t>
+            </a:r>
+            <a:r>
+              <a:rPr lang="en-US" b="1" dirty="0" smtClean="0">
+                <a:solidFill>
+                  <a:schemeClr val="bg1"/>
+                </a:solidFill>
+              </a:rPr>
+              <a:t>5 Aug</a:t>
+            </a:r>
+            <a:r>
+              <a:rPr lang="en-US" b="1" dirty="0" smtClean="0">
+                <a:solidFill>
+                  <a:schemeClr val="bg1"/>
+                </a:solidFill>
+              </a:rPr>
+              <a:t> </a:t>
+            </a:r>
+            <a:endParaRPr lang="en-US" b="1" dirty="0">
+              <a:solidFill>
+                <a:schemeClr val="bg1"/>
+              </a:solidFill>
+            </a:endParaRPr>
+          </a:p>
+        </p:txBody>
+      </p:sp>
+      <p:sp>
+        <p:nvSpPr>
+          <p:cNvPr id="3" name="Content Placeholder 2"/>
+          <p:cNvSpPr>
+            <a:spLocks noGrp="1"/>
+          </p:cNvSpPr>
+          <p:nvPr>
+            <p:ph idx="1"/>
+          </p:nvPr>
+        </p:nvSpPr>
+        <p:spPr>
+          <a:xfrm>
+            <a:off x="381000" y="1219200"/>
+            <a:ext cx="8382000" cy="5334000"/>
+          </a:xfrm>
+        </p:spPr>
+        <p:txBody>
+          <a:bodyPr>
+            <a:normAutofit/>
+          </a:bodyPr>
+          <a:lstStyle/>
+          <a:p>
+            <a:pPr>
+              <a:buNone/>
+            </a:pPr>
+            <a:r>
+              <a:rPr lang="en-US" dirty="0" smtClean="0">
+                <a:solidFill>
+                  <a:schemeClr val="bg1"/>
+                </a:solidFill>
+              </a:rPr>
+              <a:t>1992 : </a:t>
+            </a:r>
+            <a:r>
+              <a:rPr lang="en-US" dirty="0" err="1" smtClean="0">
+                <a:solidFill>
+                  <a:schemeClr val="bg1"/>
+                </a:solidFill>
+              </a:rPr>
+              <a:t>Bhagat</a:t>
+            </a:r>
+            <a:r>
+              <a:rPr lang="en-US" dirty="0" smtClean="0">
+                <a:solidFill>
+                  <a:schemeClr val="bg1"/>
+                </a:solidFill>
+              </a:rPr>
+              <a:t> </a:t>
+            </a:r>
+            <a:r>
+              <a:rPr lang="en-US" dirty="0" err="1" smtClean="0">
+                <a:solidFill>
+                  <a:schemeClr val="bg1"/>
+                </a:solidFill>
+              </a:rPr>
+              <a:t>Puran</a:t>
+            </a:r>
+            <a:r>
+              <a:rPr lang="en-US" dirty="0" smtClean="0">
+                <a:solidFill>
+                  <a:schemeClr val="bg1"/>
+                </a:solidFill>
+              </a:rPr>
+              <a:t> Singh</a:t>
+            </a:r>
+          </a:p>
+          <a:p>
+            <a:pPr>
+              <a:buNone/>
+            </a:pPr>
+            <a:r>
+              <a:rPr lang="en-US" dirty="0" smtClean="0">
+                <a:solidFill>
+                  <a:schemeClr val="bg1"/>
+                </a:solidFill>
+              </a:rPr>
+              <a:t>Passed Away</a:t>
+            </a:r>
+          </a:p>
+          <a:p>
+            <a:pPr>
+              <a:buNone/>
+            </a:pPr>
+            <a:endParaRPr lang="en-US" dirty="0" smtClean="0">
+              <a:solidFill>
+                <a:schemeClr val="bg1"/>
+              </a:solidFill>
+            </a:endParaRPr>
+          </a:p>
+          <a:p>
+            <a:pPr>
+              <a:buNone/>
+            </a:pPr>
+            <a:r>
+              <a:rPr lang="en-US" dirty="0" smtClean="0">
+                <a:solidFill>
+                  <a:schemeClr val="bg1"/>
+                </a:solidFill>
+              </a:rPr>
+              <a:t>Founder of </a:t>
+            </a:r>
+            <a:r>
+              <a:rPr lang="en-US" dirty="0" err="1" smtClean="0">
+                <a:solidFill>
+                  <a:schemeClr val="bg1"/>
+                </a:solidFill>
+              </a:rPr>
+              <a:t>Pingalwara</a:t>
+            </a:r>
+            <a:r>
+              <a:rPr lang="en-US" dirty="0" smtClean="0">
+                <a:solidFill>
+                  <a:schemeClr val="bg1"/>
+                </a:solidFill>
+              </a:rPr>
+              <a:t> </a:t>
+            </a:r>
+          </a:p>
+          <a:p>
+            <a:pPr>
+              <a:buNone/>
+            </a:pPr>
+            <a:endParaRPr lang="en-US" dirty="0" smtClean="0">
+              <a:solidFill>
+                <a:schemeClr val="bg1"/>
+              </a:solidFill>
+            </a:endParaRPr>
+          </a:p>
+          <a:p>
+            <a:pPr>
+              <a:buNone/>
+            </a:pPr>
+            <a:r>
+              <a:rPr lang="en-US" dirty="0" smtClean="0">
+                <a:solidFill>
+                  <a:schemeClr val="bg1"/>
+                </a:solidFill>
+              </a:rPr>
+              <a:t>Helping</a:t>
+            </a:r>
+            <a:endParaRPr lang="en-US" dirty="0" smtClean="0">
+              <a:solidFill>
+                <a:schemeClr val="bg1"/>
+              </a:solidFill>
+            </a:endParaRPr>
+          </a:p>
+          <a:p>
+            <a:pPr>
+              <a:buNone/>
+            </a:pPr>
+            <a:r>
+              <a:rPr lang="en-US" dirty="0" smtClean="0">
+                <a:solidFill>
+                  <a:schemeClr val="bg1"/>
+                </a:solidFill>
+              </a:rPr>
+              <a:t>individuals who are sick, </a:t>
+            </a:r>
+            <a:endParaRPr lang="en-US" dirty="0" smtClean="0">
+              <a:solidFill>
+                <a:schemeClr val="bg1"/>
+              </a:solidFill>
+            </a:endParaRPr>
+          </a:p>
+          <a:p>
+            <a:pPr>
+              <a:buNone/>
+            </a:pPr>
+            <a:r>
+              <a:rPr lang="en-US" dirty="0" smtClean="0">
+                <a:solidFill>
+                  <a:schemeClr val="bg1"/>
+                </a:solidFill>
+              </a:rPr>
+              <a:t>Disabled and </a:t>
+            </a:r>
+            <a:r>
+              <a:rPr lang="en-US" dirty="0" smtClean="0">
+                <a:solidFill>
+                  <a:schemeClr val="bg1"/>
+                </a:solidFill>
+              </a:rPr>
+              <a:t>deserted by </a:t>
+            </a:r>
+            <a:endParaRPr lang="en-US" dirty="0" smtClean="0">
+              <a:solidFill>
+                <a:schemeClr val="bg1"/>
+              </a:solidFill>
+            </a:endParaRPr>
+          </a:p>
+          <a:p>
+            <a:pPr>
+              <a:buNone/>
+            </a:pPr>
+            <a:r>
+              <a:rPr lang="en-US" dirty="0" smtClean="0">
+                <a:solidFill>
+                  <a:schemeClr val="bg1"/>
+                </a:solidFill>
+              </a:rPr>
+              <a:t>mankind</a:t>
+            </a:r>
+            <a:endParaRPr lang="en-US" dirty="0" smtClean="0">
+              <a:solidFill>
+                <a:schemeClr val="bg1"/>
+              </a:solidFill>
+            </a:endParaRPr>
+          </a:p>
+        </p:txBody>
+      </p:sp>
+      <p:pic>
+        <p:nvPicPr>
+          <p:cNvPr id="1028" name="Picture 4" descr="https://causes-prod.caudn.com/photos/rf/qj/bX/Op/Uf/fR/lo/uvB.jpg"/>
+          <p:cNvPicPr>
+            <a:picLocks noChangeAspect="1" noChangeArrowheads="1"/>
+          </p:cNvPicPr>
+          <p:nvPr/>
+        </p:nvPicPr>
+        <p:blipFill>
+          <a:blip r:embed="rId2"/>
+          <a:srcRect/>
+          <a:stretch>
+            <a:fillRect/>
+          </a:stretch>
+        </p:blipFill>
+        <p:spPr bwMode="auto">
+          <a:xfrm>
+            <a:off x="5181600" y="1828800"/>
+            <a:ext cx="3088718" cy="4114800"/>
+          </a:xfrm>
+          <a:prstGeom prst="rect">
+            <a:avLst/>
+          </a:prstGeom>
+          <a:noFill/>
         </p:spPr>
       </p:pic>
     </p:spTree>

</xml_diff>